<commit_message>
Red-Black Tree restruct 함수 리펙토링.
</commit_message>
<xml_diff>
--- a/DOC/Tree_1/Red-Black Tree.pptx
+++ b/DOC/Tree_1/Red-Black Tree.pptx
@@ -2978,7 +2978,7 @@
         </p:nvSpPr>
         <p:spPr>
           <a:xfrm>
-            <a:off x="3179618" y="613064"/>
+            <a:off x="0" y="0"/>
             <a:ext cx="5413664" cy="369332"/>
           </a:xfrm>
           <a:prstGeom prst="rect">
@@ -2993,8 +2993,16 @@
           <a:lstStyle/>
           <a:p>
             <a:r>
+              <a:rPr lang="en-US" altLang="ko-KR" dirty="0" smtClean="0">
+                <a:solidFill>
+                  <a:srgbClr val="FF0000"/>
+                </a:solidFill>
+              </a:rPr>
+              <a:t>9, 7, 8</a:t>
+            </a:r>
+            <a:r>
               <a:rPr lang="en-US" altLang="ko-KR" dirty="0" smtClean="0"/>
-              <a:t>9, 7, 8/, 6, 4, 5, 2, 3</a:t>
+              <a:t>, 6, 4, 5, 2, 3</a:t>
             </a:r>
             <a:endParaRPr lang="ko-KR" altLang="en-US" dirty="0"/>
           </a:p>
@@ -3449,36 +3457,6 @@
       </p:grpSpPr>
       <p:sp>
         <p:nvSpPr>
-          <p:cNvPr id="4" name="TextBox 3"/>
-          <p:cNvSpPr txBox="1"/>
-          <p:nvPr/>
-        </p:nvSpPr>
-        <p:spPr>
-          <a:xfrm>
-            <a:off x="3179618" y="613064"/>
-            <a:ext cx="5413664" cy="369332"/>
-          </a:xfrm>
-          <a:prstGeom prst="rect">
-            <a:avLst/>
-          </a:prstGeom>
-          <a:noFill/>
-        </p:spPr>
-        <p:txBody>
-          <a:bodyPr wrap="square" rtlCol="0">
-            <a:spAutoFit/>
-          </a:bodyPr>
-          <a:lstStyle/>
-          <a:p>
-            <a:r>
-              <a:rPr lang="en-US" altLang="ko-KR" dirty="0" smtClean="0"/>
-              <a:t>9, 7, 8, 6/, 4, 5, 2, 3</a:t>
-            </a:r>
-            <a:endParaRPr lang="ko-KR" altLang="en-US" dirty="0"/>
-          </a:p>
-        </p:txBody>
-      </p:sp>
-      <p:sp>
-        <p:nvSpPr>
           <p:cNvPr id="8" name="타원 7"/>
           <p:cNvSpPr/>
           <p:nvPr/>
@@ -4053,6 +4031,44 @@
           </a:fontRef>
         </p:style>
       </p:cxnSp>
+      <p:sp>
+        <p:nvSpPr>
+          <p:cNvPr id="31" name="TextBox 30"/>
+          <p:cNvSpPr txBox="1"/>
+          <p:nvPr/>
+        </p:nvSpPr>
+        <p:spPr>
+          <a:xfrm>
+            <a:off x="0" y="0"/>
+            <a:ext cx="5413664" cy="369332"/>
+          </a:xfrm>
+          <a:prstGeom prst="rect">
+            <a:avLst/>
+          </a:prstGeom>
+          <a:noFill/>
+        </p:spPr>
+        <p:txBody>
+          <a:bodyPr wrap="square" rtlCol="0">
+            <a:spAutoFit/>
+          </a:bodyPr>
+          <a:lstStyle/>
+          <a:p>
+            <a:r>
+              <a:rPr lang="en-US" altLang="ko-KR" dirty="0" smtClean="0">
+                <a:solidFill>
+                  <a:srgbClr val="FF0000"/>
+                </a:solidFill>
+              </a:rPr>
+              <a:t>9, 7, 8, 6</a:t>
+            </a:r>
+            <a:r>
+              <a:rPr lang="en-US" altLang="ko-KR" dirty="0" smtClean="0"/>
+              <a:t>, 4, 5, 2, 3</a:t>
+            </a:r>
+            <a:endParaRPr lang="ko-KR" altLang="en-US" dirty="0"/>
+          </a:p>
+        </p:txBody>
+      </p:sp>
     </p:spTree>
     <p:extLst>
       <p:ext uri="{BB962C8B-B14F-4D97-AF65-F5344CB8AC3E}">
@@ -4085,36 +4101,6 @@
       </p:grpSpPr>
       <p:sp>
         <p:nvSpPr>
-          <p:cNvPr id="4" name="TextBox 3"/>
-          <p:cNvSpPr txBox="1"/>
-          <p:nvPr/>
-        </p:nvSpPr>
-        <p:spPr>
-          <a:xfrm>
-            <a:off x="3179618" y="613064"/>
-            <a:ext cx="5413664" cy="369332"/>
-          </a:xfrm>
-          <a:prstGeom prst="rect">
-            <a:avLst/>
-          </a:prstGeom>
-          <a:noFill/>
-        </p:spPr>
-        <p:txBody>
-          <a:bodyPr wrap="square" rtlCol="0">
-            <a:spAutoFit/>
-          </a:bodyPr>
-          <a:lstStyle/>
-          <a:p>
-            <a:r>
-              <a:rPr lang="en-US" altLang="ko-KR" dirty="0" smtClean="0"/>
-              <a:t>9, 7, 8, 6, 4/, 5, 2, 3</a:t>
-            </a:r>
-            <a:endParaRPr lang="ko-KR" altLang="en-US" dirty="0"/>
-          </a:p>
-        </p:txBody>
-      </p:sp>
-      <p:sp>
-        <p:nvSpPr>
           <p:cNvPr id="8" name="타원 7"/>
           <p:cNvSpPr/>
           <p:nvPr/>
@@ -4854,6 +4840,44 @@
           </a:fontRef>
         </p:style>
       </p:cxnSp>
+      <p:sp>
+        <p:nvSpPr>
+          <p:cNvPr id="37" name="TextBox 36"/>
+          <p:cNvSpPr txBox="1"/>
+          <p:nvPr/>
+        </p:nvSpPr>
+        <p:spPr>
+          <a:xfrm>
+            <a:off x="0" y="0"/>
+            <a:ext cx="5413664" cy="369332"/>
+          </a:xfrm>
+          <a:prstGeom prst="rect">
+            <a:avLst/>
+          </a:prstGeom>
+          <a:noFill/>
+        </p:spPr>
+        <p:txBody>
+          <a:bodyPr wrap="square" rtlCol="0">
+            <a:spAutoFit/>
+          </a:bodyPr>
+          <a:lstStyle/>
+          <a:p>
+            <a:r>
+              <a:rPr lang="en-US" altLang="ko-KR" dirty="0" smtClean="0">
+                <a:solidFill>
+                  <a:srgbClr val="FF0000"/>
+                </a:solidFill>
+              </a:rPr>
+              <a:t>9, 7, 8, 6, 4,</a:t>
+            </a:r>
+            <a:r>
+              <a:rPr lang="en-US" altLang="ko-KR" dirty="0" smtClean="0"/>
+              <a:t> 5, 2, 3</a:t>
+            </a:r>
+            <a:endParaRPr lang="ko-KR" altLang="en-US" dirty="0"/>
+          </a:p>
+        </p:txBody>
+      </p:sp>
     </p:spTree>
     <p:extLst>
       <p:ext uri="{BB962C8B-B14F-4D97-AF65-F5344CB8AC3E}">
@@ -4886,36 +4910,6 @@
       </p:grpSpPr>
       <p:sp>
         <p:nvSpPr>
-          <p:cNvPr id="4" name="TextBox 3"/>
-          <p:cNvSpPr txBox="1"/>
-          <p:nvPr/>
-        </p:nvSpPr>
-        <p:spPr>
-          <a:xfrm>
-            <a:off x="3179618" y="613064"/>
-            <a:ext cx="5413664" cy="369332"/>
-          </a:xfrm>
-          <a:prstGeom prst="rect">
-            <a:avLst/>
-          </a:prstGeom>
-          <a:noFill/>
-        </p:spPr>
-        <p:txBody>
-          <a:bodyPr wrap="square" rtlCol="0">
-            <a:spAutoFit/>
-          </a:bodyPr>
-          <a:lstStyle/>
-          <a:p>
-            <a:r>
-              <a:rPr lang="en-US" altLang="ko-KR" dirty="0" smtClean="0"/>
-              <a:t>9, 7, 8, 6, 4, 5/, 2, 3</a:t>
-            </a:r>
-            <a:endParaRPr lang="ko-KR" altLang="en-US" dirty="0"/>
-          </a:p>
-        </p:txBody>
-      </p:sp>
-      <p:sp>
-        <p:nvSpPr>
           <p:cNvPr id="12" name="타원 11"/>
           <p:cNvSpPr/>
           <p:nvPr/>
@@ -5815,6 +5809,56 @@
           </a:fontRef>
         </p:style>
       </p:cxnSp>
+      <p:sp>
+        <p:nvSpPr>
+          <p:cNvPr id="50" name="TextBox 49"/>
+          <p:cNvSpPr txBox="1"/>
+          <p:nvPr/>
+        </p:nvSpPr>
+        <p:spPr>
+          <a:xfrm>
+            <a:off x="0" y="0"/>
+            <a:ext cx="5413664" cy="369332"/>
+          </a:xfrm>
+          <a:prstGeom prst="rect">
+            <a:avLst/>
+          </a:prstGeom>
+          <a:noFill/>
+        </p:spPr>
+        <p:txBody>
+          <a:bodyPr wrap="square" rtlCol="0">
+            <a:spAutoFit/>
+          </a:bodyPr>
+          <a:lstStyle/>
+          <a:p>
+            <a:r>
+              <a:rPr lang="en-US" altLang="ko-KR" dirty="0" smtClean="0">
+                <a:solidFill>
+                  <a:srgbClr val="FF0000"/>
+                </a:solidFill>
+              </a:rPr>
+              <a:t>9, 7, 8, 6, 4,</a:t>
+            </a:r>
+            <a:r>
+              <a:rPr lang="en-US" altLang="ko-KR" dirty="0" smtClean="0"/>
+              <a:t> </a:t>
+            </a:r>
+            <a:r>
+              <a:rPr lang="en-US" altLang="ko-KR" dirty="0" smtClean="0">
+                <a:solidFill>
+                  <a:srgbClr val="FF0000"/>
+                </a:solidFill>
+              </a:rPr>
+              <a:t>5,</a:t>
+            </a:r>
+            <a:r>
+              <a:rPr lang="en-US" altLang="ko-KR" dirty="0" smtClean="0"/>
+              <a:t> 2, 3</a:t>
+            </a:r>
+            <a:endParaRPr lang="ko-KR" altLang="en-US" dirty="0"/>
+          </a:p>
+        </p:txBody>
+      </p:sp>
     </p:spTree>
     <p:extLst>
       <p:ext uri="{BB962C8B-B14F-4D97-AF65-F5344CB8AC3E}">
@@ -5847,36 +5891,6 @@
       </p:grpSpPr>
       <p:sp>
         <p:nvSpPr>
-          <p:cNvPr id="4" name="TextBox 3"/>
-          <p:cNvSpPr txBox="1"/>
-          <p:nvPr/>
-        </p:nvSpPr>
-        <p:spPr>
-          <a:xfrm>
-            <a:off x="3179618" y="613064"/>
-            <a:ext cx="5413664" cy="369332"/>
-          </a:xfrm>
-          <a:prstGeom prst="rect">
-            <a:avLst/>
-          </a:prstGeom>
-          <a:noFill/>
-        </p:spPr>
-        <p:txBody>
-          <a:bodyPr wrap="square" rtlCol="0">
-            <a:spAutoFit/>
-          </a:bodyPr>
-          <a:lstStyle/>
-          <a:p>
-            <a:r>
-              <a:rPr lang="en-US" altLang="ko-KR" dirty="0" smtClean="0"/>
-              <a:t>9, 7, 8, 6, 4, 5, 2/, 3</a:t>
-            </a:r>
-            <a:endParaRPr lang="ko-KR" altLang="en-US" dirty="0"/>
-          </a:p>
-        </p:txBody>
-      </p:sp>
-      <p:sp>
-        <p:nvSpPr>
           <p:cNvPr id="19" name="타원 18"/>
           <p:cNvSpPr/>
           <p:nvPr/>
@@ -6408,6 +6422,68 @@
           </a:fontRef>
         </p:style>
       </p:cxnSp>
+      <p:sp>
+        <p:nvSpPr>
+          <p:cNvPr id="35" name="TextBox 34"/>
+          <p:cNvSpPr txBox="1"/>
+          <p:nvPr/>
+        </p:nvSpPr>
+        <p:spPr>
+          <a:xfrm>
+            <a:off x="0" y="0"/>
+            <a:ext cx="5413664" cy="369332"/>
+          </a:xfrm>
+          <a:prstGeom prst="rect">
+            <a:avLst/>
+          </a:prstGeom>
+          <a:noFill/>
+        </p:spPr>
+        <p:txBody>
+          <a:bodyPr wrap="square" rtlCol="0">
+            <a:spAutoFit/>
+          </a:bodyPr>
+          <a:lstStyle/>
+          <a:p>
+            <a:r>
+              <a:rPr lang="en-US" altLang="ko-KR" dirty="0" smtClean="0">
+                <a:solidFill>
+                  <a:srgbClr val="FF0000"/>
+                </a:solidFill>
+              </a:rPr>
+              <a:t>9, 7, 8, 6, 4,</a:t>
+            </a:r>
+            <a:r>
+              <a:rPr lang="en-US" altLang="ko-KR" dirty="0" smtClean="0"/>
+              <a:t> </a:t>
+            </a:r>
+            <a:r>
+              <a:rPr lang="en-US" altLang="ko-KR" dirty="0" smtClean="0">
+                <a:solidFill>
+                  <a:srgbClr val="FF0000"/>
+                </a:solidFill>
+              </a:rPr>
+              <a:t>5,</a:t>
+            </a:r>
+            <a:r>
+              <a:rPr lang="en-US" altLang="ko-KR" dirty="0" smtClean="0"/>
+              <a:t> </a:t>
+            </a:r>
+            <a:r>
+              <a:rPr lang="en-US" altLang="ko-KR" dirty="0" smtClean="0">
+                <a:solidFill>
+                  <a:srgbClr val="FF0000"/>
+                </a:solidFill>
+              </a:rPr>
+              <a:t>2,</a:t>
+            </a:r>
+            <a:r>
+              <a:rPr lang="en-US" altLang="ko-KR" dirty="0" smtClean="0"/>
+              <a:t> 3</a:t>
+            </a:r>
+            <a:endParaRPr lang="ko-KR" altLang="en-US" dirty="0"/>
+          </a:p>
+        </p:txBody>
+      </p:sp>
     </p:spTree>
     <p:extLst>
       <p:ext uri="{BB962C8B-B14F-4D97-AF65-F5344CB8AC3E}">
@@ -6440,36 +6516,6 @@
       </p:grpSpPr>
       <p:sp>
         <p:nvSpPr>
-          <p:cNvPr id="4" name="TextBox 3"/>
-          <p:cNvSpPr txBox="1"/>
-          <p:nvPr/>
-        </p:nvSpPr>
-        <p:spPr>
-          <a:xfrm>
-            <a:off x="446710" y="228036"/>
-            <a:ext cx="5413664" cy="369332"/>
-          </a:xfrm>
-          <a:prstGeom prst="rect">
-            <a:avLst/>
-          </a:prstGeom>
-          <a:noFill/>
-        </p:spPr>
-        <p:txBody>
-          <a:bodyPr wrap="square" rtlCol="0">
-            <a:spAutoFit/>
-          </a:bodyPr>
-          <a:lstStyle/>
-          <a:p>
-            <a:r>
-              <a:rPr lang="en-US" altLang="ko-KR" dirty="0" smtClean="0"/>
-              <a:t>9, 7, 8, 6, 4, 5, 2, 3/</a:t>
-            </a:r>
-            <a:endParaRPr lang="ko-KR" altLang="en-US" dirty="0"/>
-          </a:p>
-        </p:txBody>
-      </p:sp>
-      <p:sp>
-        <p:nvSpPr>
           <p:cNvPr id="26" name="타원 25"/>
           <p:cNvSpPr/>
           <p:nvPr/>
@@ -7693,6 +7739,80 @@
           </a:fontRef>
         </p:style>
       </p:cxnSp>
+      <p:sp>
+        <p:nvSpPr>
+          <p:cNvPr id="71" name="TextBox 70"/>
+          <p:cNvSpPr txBox="1"/>
+          <p:nvPr/>
+        </p:nvSpPr>
+        <p:spPr>
+          <a:xfrm>
+            <a:off x="0" y="0"/>
+            <a:ext cx="5413664" cy="369332"/>
+          </a:xfrm>
+          <a:prstGeom prst="rect">
+            <a:avLst/>
+          </a:prstGeom>
+          <a:noFill/>
+        </p:spPr>
+        <p:txBody>
+          <a:bodyPr wrap="square" rtlCol="0">
+            <a:spAutoFit/>
+          </a:bodyPr>
+          <a:lstStyle/>
+          <a:p>
+            <a:r>
+              <a:rPr lang="en-US" altLang="ko-KR" dirty="0" smtClean="0">
+                <a:solidFill>
+                  <a:srgbClr val="FF0000"/>
+                </a:solidFill>
+              </a:rPr>
+              <a:t>9, 7, 8, 6, 4,</a:t>
+            </a:r>
+            <a:r>
+              <a:rPr lang="en-US" altLang="ko-KR" dirty="0" smtClean="0"/>
+              <a:t> </a:t>
+            </a:r>
+            <a:r>
+              <a:rPr lang="en-US" altLang="ko-KR" dirty="0" smtClean="0">
+                <a:solidFill>
+                  <a:srgbClr val="FF0000"/>
+                </a:solidFill>
+              </a:rPr>
+              <a:t>5,</a:t>
+            </a:r>
+            <a:r>
+              <a:rPr lang="en-US" altLang="ko-KR" dirty="0" smtClean="0"/>
+              <a:t> </a:t>
+            </a:r>
+            <a:r>
+              <a:rPr lang="en-US" altLang="ko-KR" dirty="0" smtClean="0">
+                <a:solidFill>
+                  <a:srgbClr val="FF0000"/>
+                </a:solidFill>
+              </a:rPr>
+              <a:t>2,</a:t>
+            </a:r>
+            <a:r>
+              <a:rPr lang="en-US" altLang="ko-KR" dirty="0" smtClean="0"/>
+              <a:t> </a:t>
+            </a:r>
+            <a:r>
+              <a:rPr lang="en-US" altLang="ko-KR" dirty="0" smtClean="0">
+                <a:solidFill>
+                  <a:srgbClr val="FF0000"/>
+                </a:solidFill>
+              </a:rPr>
+              <a:t>3</a:t>
+            </a:r>
+            <a:endParaRPr lang="ko-KR" altLang="en-US" dirty="0">
+              <a:solidFill>
+                <a:srgbClr val="FF0000"/>
+              </a:solidFill>
+            </a:endParaRPr>
+          </a:p>
+        </p:txBody>
+      </p:sp>
     </p:spTree>
     <p:extLst>
       <p:ext uri="{BB962C8B-B14F-4D97-AF65-F5344CB8AC3E}">
@@ -7725,36 +7845,6 @@
       </p:grpSpPr>
       <p:sp>
         <p:nvSpPr>
-          <p:cNvPr id="4" name="TextBox 3"/>
-          <p:cNvSpPr txBox="1"/>
-          <p:nvPr/>
-        </p:nvSpPr>
-        <p:spPr>
-          <a:xfrm>
-            <a:off x="3179618" y="613064"/>
-            <a:ext cx="5413664" cy="369332"/>
-          </a:xfrm>
-          <a:prstGeom prst="rect">
-            <a:avLst/>
-          </a:prstGeom>
-          <a:noFill/>
-        </p:spPr>
-        <p:txBody>
-          <a:bodyPr wrap="square" rtlCol="0">
-            <a:spAutoFit/>
-          </a:bodyPr>
-          <a:lstStyle/>
-          <a:p>
-            <a:r>
-              <a:rPr lang="en-US" altLang="ko-KR" dirty="0" smtClean="0"/>
-              <a:t>9, 7, 8, 6, 4, 5, 2, 3/</a:t>
-            </a:r>
-            <a:endParaRPr lang="ko-KR" altLang="en-US" dirty="0"/>
-          </a:p>
-        </p:txBody>
-      </p:sp>
-      <p:sp>
-        <p:nvSpPr>
           <p:cNvPr id="11" name="타원 10"/>
           <p:cNvSpPr/>
           <p:nvPr/>
@@ -8982,6 +9072,80 @@
           </a:fontRef>
         </p:style>
       </p:cxnSp>
+      <p:sp>
+        <p:nvSpPr>
+          <p:cNvPr id="70" name="TextBox 69"/>
+          <p:cNvSpPr txBox="1"/>
+          <p:nvPr/>
+        </p:nvSpPr>
+        <p:spPr>
+          <a:xfrm>
+            <a:off x="0" y="0"/>
+            <a:ext cx="5413664" cy="369332"/>
+          </a:xfrm>
+          <a:prstGeom prst="rect">
+            <a:avLst/>
+          </a:prstGeom>
+          <a:noFill/>
+        </p:spPr>
+        <p:txBody>
+          <a:bodyPr wrap="square" rtlCol="0">
+            <a:spAutoFit/>
+          </a:bodyPr>
+          <a:lstStyle/>
+          <a:p>
+            <a:r>
+              <a:rPr lang="en-US" altLang="ko-KR" dirty="0" smtClean="0">
+                <a:solidFill>
+                  <a:srgbClr val="FF0000"/>
+                </a:solidFill>
+              </a:rPr>
+              <a:t>9, 7, 8, 6, 4,</a:t>
+            </a:r>
+            <a:r>
+              <a:rPr lang="en-US" altLang="ko-KR" dirty="0" smtClean="0"/>
+              <a:t> </a:t>
+            </a:r>
+            <a:r>
+              <a:rPr lang="en-US" altLang="ko-KR" dirty="0" smtClean="0">
+                <a:solidFill>
+                  <a:srgbClr val="FF0000"/>
+                </a:solidFill>
+              </a:rPr>
+              <a:t>5,</a:t>
+            </a:r>
+            <a:r>
+              <a:rPr lang="en-US" altLang="ko-KR" dirty="0" smtClean="0"/>
+              <a:t> </a:t>
+            </a:r>
+            <a:r>
+              <a:rPr lang="en-US" altLang="ko-KR" dirty="0" smtClean="0">
+                <a:solidFill>
+                  <a:srgbClr val="FF0000"/>
+                </a:solidFill>
+              </a:rPr>
+              <a:t>2,</a:t>
+            </a:r>
+            <a:r>
+              <a:rPr lang="en-US" altLang="ko-KR" dirty="0" smtClean="0"/>
+              <a:t> </a:t>
+            </a:r>
+            <a:r>
+              <a:rPr lang="en-US" altLang="ko-KR" dirty="0" smtClean="0">
+                <a:solidFill>
+                  <a:srgbClr val="FF0000"/>
+                </a:solidFill>
+              </a:rPr>
+              <a:t>3</a:t>
+            </a:r>
+            <a:endParaRPr lang="ko-KR" altLang="en-US" dirty="0">
+              <a:solidFill>
+                <a:srgbClr val="FF0000"/>
+              </a:solidFill>
+            </a:endParaRPr>
+          </a:p>
+        </p:txBody>
+      </p:sp>
     </p:spTree>
     <p:extLst>
       <p:ext uri="{BB962C8B-B14F-4D97-AF65-F5344CB8AC3E}">

</xml_diff>